<commit_message>
adjustments first 7 slides
</commit_message>
<xml_diff>
--- a/documentation/CS699 Project Presentation.pptx
+++ b/documentation/CS699 Project Presentation.pptx
@@ -116,6 +116,11 @@
       </a:defRPr>
     </a:lvl9pPr>
   </p:defaultTextStyle>
+  <p:extLst>
+    <p:ext uri="{EFAFB233-063F-42B5-8137-9DF3F51BA10A}">
+      <p15:sldGuideLst xmlns:p15="http://schemas.microsoft.com/office/powerpoint/2012/main"/>
+    </p:ext>
+  </p:extLst>
 </p:presentation>
 </file>
 
@@ -393,7 +398,7 @@
           <a:p>
             <a:fld id="{78ABE3C1-DBE1-495D-B57B-2849774B866A}" type="datetimeFigureOut">
               <a:rPr lang="en-US" dirty="0"/>
-              <a:t>4/19/2020</a:t>
+              <a:t>4/22/2020</a:t>
             </a:fld>
             <a:endParaRPr lang="en-US" dirty="0"/>
           </a:p>
@@ -802,7 +807,7 @@
           <a:p>
             <a:fld id="{446C117F-5CCF-4837-BE5F-2B92066CAFAF}" type="datetimeFigureOut">
               <a:rPr lang="en-US" dirty="0"/>
-              <a:t>4/19/2020</a:t>
+              <a:t>4/22/2020</a:t>
             </a:fld>
             <a:endParaRPr lang="en-US" dirty="0"/>
           </a:p>
@@ -1133,7 +1138,7 @@
           <a:p>
             <a:fld id="{84EB90BD-B6CE-46B7-997F-7313B992CCDC}" type="datetimeFigureOut">
               <a:rPr lang="en-US" dirty="0"/>
-              <a:t>4/19/2020</a:t>
+              <a:t>4/22/2020</a:t>
             </a:fld>
             <a:endParaRPr lang="en-US" dirty="0"/>
           </a:p>
@@ -1533,7 +1538,7 @@
           <a:p>
             <a:fld id="{CDB9D11F-B188-461D-B23F-39381795C052}" type="datetimeFigureOut">
               <a:rPr lang="en-US" dirty="0"/>
-              <a:t>4/19/2020</a:t>
+              <a:t>4/22/2020</a:t>
             </a:fld>
             <a:endParaRPr lang="en-US" dirty="0"/>
           </a:p>
@@ -2096,7 +2101,7 @@
           <a:p>
             <a:fld id="{52E6D8D9-55A2-4063-B0F3-121F44549695}" type="datetimeFigureOut">
               <a:rPr lang="en-US" dirty="0"/>
-              <a:t>4/19/2020</a:t>
+              <a:t>4/22/2020</a:t>
             </a:fld>
             <a:endParaRPr lang="en-US" dirty="0"/>
           </a:p>
@@ -2772,7 +2777,7 @@
           <a:p>
             <a:fld id="{D4B24536-994D-4021-A283-9F449C0DB509}" type="datetimeFigureOut">
               <a:rPr lang="en-US" dirty="0"/>
-              <a:t>4/19/2020</a:t>
+              <a:t>4/22/2020</a:t>
             </a:fld>
             <a:endParaRPr lang="en-US" dirty="0"/>
           </a:p>
@@ -3680,7 +3685,7 @@
           <a:p>
             <a:fld id="{3CBBBB78-C96F-47B7-AB17-D852CA960AC9}" type="datetimeFigureOut">
               <a:rPr lang="en-US" dirty="0"/>
-              <a:t>4/19/2020</a:t>
+              <a:t>4/22/2020</a:t>
             </a:fld>
             <a:endParaRPr lang="en-US" dirty="0"/>
           </a:p>
@@ -3988,7 +3993,7 @@
           <a:p>
             <a:fld id="{1FA3F48C-C7C6-4055-9F49-3777875E72AE}" type="datetimeFigureOut">
               <a:rPr lang="en-US" dirty="0"/>
-              <a:t>4/19/2020</a:t>
+              <a:t>4/22/2020</a:t>
             </a:fld>
             <a:endParaRPr lang="en-US" dirty="0"/>
           </a:p>
@@ -4247,7 +4252,7 @@
           <a:p>
             <a:fld id="{6178E61D-D431-422C-9764-11DAFE33AB63}" type="datetimeFigureOut">
               <a:rPr lang="en-US" dirty="0"/>
-              <a:t>4/19/2020</a:t>
+              <a:t>4/22/2020</a:t>
             </a:fld>
             <a:endParaRPr lang="en-US" dirty="0"/>
           </a:p>
@@ -4566,7 +4571,7 @@
           <a:p>
             <a:fld id="{12DE42F4-6EEF-4EF7-8ED4-2208F0F89A08}" type="datetimeFigureOut">
               <a:rPr lang="en-US" dirty="0"/>
-              <a:t>4/19/2020</a:t>
+              <a:t>4/22/2020</a:t>
             </a:fld>
             <a:endParaRPr lang="en-US" dirty="0"/>
           </a:p>
@@ -4950,7 +4955,7 @@
           <a:p>
             <a:fld id="{30578ACC-22D6-47C1-A373-4FD133E34F3C}" type="datetimeFigureOut">
               <a:rPr lang="en-US" dirty="0"/>
-              <a:t>4/19/2020</a:t>
+              <a:t>4/22/2020</a:t>
             </a:fld>
             <a:endParaRPr lang="en-US" dirty="0"/>
           </a:p>
@@ -5321,7 +5326,7 @@
           <a:p>
             <a:fld id="{4E5A6C69-6797-4E8A-BF37-F2C3751466E9}" type="datetimeFigureOut">
               <a:rPr lang="en-US" dirty="0"/>
-              <a:t>4/19/2020</a:t>
+              <a:t>4/22/2020</a:t>
             </a:fld>
             <a:endParaRPr lang="en-US" dirty="0"/>
           </a:p>
@@ -5822,7 +5827,7 @@
           <a:p>
             <a:fld id="{D82014A1-A632-4878-A0D3-F52BA7563730}" type="datetimeFigureOut">
               <a:rPr lang="en-US" dirty="0"/>
-              <a:t>4/19/2020</a:t>
+              <a:t>4/22/2020</a:t>
             </a:fld>
             <a:endParaRPr lang="en-US" dirty="0"/>
           </a:p>
@@ -6074,7 +6079,7 @@
           <a:p>
             <a:fld id="{CE99F462-093F-4566-844B-4C71F2739DA5}" type="datetimeFigureOut">
               <a:rPr lang="en-US" dirty="0"/>
-              <a:t>4/19/2020</a:t>
+              <a:t>4/22/2020</a:t>
             </a:fld>
             <a:endParaRPr lang="en-US" dirty="0"/>
           </a:p>
@@ -6232,7 +6237,7 @@
           <a:p>
             <a:fld id="{3D24A7AC-904D-4781-85BA-7D10C17ED021}" type="datetimeFigureOut">
               <a:rPr lang="en-US" dirty="0"/>
-              <a:t>4/19/2020</a:t>
+              <a:t>4/22/2020</a:t>
             </a:fld>
             <a:endParaRPr lang="en-US" dirty="0"/>
           </a:p>
@@ -6617,7 +6622,7 @@
           <a:p>
             <a:fld id="{E331444B-B92B-4E27-8C94-BB93EAF5CB18}" type="datetimeFigureOut">
               <a:rPr lang="en-US" dirty="0"/>
-              <a:t>4/19/2020</a:t>
+              <a:t>4/22/2020</a:t>
             </a:fld>
             <a:endParaRPr lang="en-US" dirty="0"/>
           </a:p>
@@ -7021,7 +7026,7 @@
           <a:p>
             <a:fld id="{363EFA5E-FA76-400D-B3DC-F0BA90E6D107}" type="datetimeFigureOut">
               <a:rPr lang="en-US" dirty="0"/>
-              <a:t>4/19/2020</a:t>
+              <a:t>4/22/2020</a:t>
             </a:fld>
             <a:endParaRPr lang="en-US" dirty="0"/>
           </a:p>
@@ -7260,7 +7265,7 @@
           <a:p>
             <a:fld id="{9D6E9DEC-419B-4CC5-A080-3B06BD5A8291}" type="datetimeFigureOut">
               <a:rPr lang="en-US" dirty="0"/>
-              <a:t>4/19/2020</a:t>
+              <a:t>4/22/2020</a:t>
             </a:fld>
             <a:endParaRPr lang="en-US" dirty="0"/>
           </a:p>
@@ -8755,16 +8760,15 @@
           </p:cNvPicPr>
           <p:nvPr/>
         </p:nvPicPr>
-        <p:blipFill>
+        <p:blipFill rotWithShape="1">
           <a:blip r:embed="rId2"/>
-          <a:stretch>
-            <a:fillRect/>
-          </a:stretch>
+          <a:srcRect b="5543"/>
+          <a:stretch/>
         </p:blipFill>
         <p:spPr>
           <a:xfrm>
-            <a:off x="1280141" y="3725003"/>
-            <a:ext cx="4308051" cy="2713513"/>
+            <a:off x="1330017" y="3699162"/>
+            <a:ext cx="4308051" cy="2563094"/>
           </a:xfrm>
           <a:prstGeom prst="rect">
             <a:avLst/>
@@ -8791,7 +8795,7 @@
         </p:blipFill>
         <p:spPr>
           <a:xfrm>
-            <a:off x="6357835" y="3521758"/>
+            <a:off x="7173386" y="3563268"/>
             <a:ext cx="3158490" cy="3068320"/>
           </a:xfrm>
           <a:prstGeom prst="rect">
@@ -8799,6 +8803,87 @@
           </a:prstGeom>
         </p:spPr>
       </p:pic>
+      <p:sp>
+        <p:nvSpPr>
+          <p:cNvPr id="6" name="TextBox 5">
+            <a:extLst>
+              <a:ext uri="{FF2B5EF4-FFF2-40B4-BE49-F238E27FC236}">
+                <a16:creationId xmlns:a16="http://schemas.microsoft.com/office/drawing/2014/main" id="{27DA874A-3653-44F4-9547-C6F905CDE000}"/>
+              </a:ext>
+            </a:extLst>
+          </p:cNvPr>
+          <p:cNvSpPr txBox="1"/>
+          <p:nvPr/>
+        </p:nvSpPr>
+        <p:spPr>
+          <a:xfrm>
+            <a:off x="2350730" y="6262256"/>
+            <a:ext cx="2266623" cy="369332"/>
+          </a:xfrm>
+          <a:prstGeom prst="rect">
+            <a:avLst/>
+          </a:prstGeom>
+          <a:noFill/>
+        </p:spPr>
+        <p:txBody>
+          <a:bodyPr wrap="square" rtlCol="0">
+            <a:spAutoFit/>
+          </a:bodyPr>
+          <a:lstStyle/>
+          <a:p>
+            <a:r>
+              <a:rPr lang="en-US" dirty="0"/>
+              <a:t>Price in 10 million $</a:t>
+            </a:r>
+          </a:p>
+        </p:txBody>
+      </p:sp>
+      <p:sp>
+        <p:nvSpPr>
+          <p:cNvPr id="8" name="Arrow: Right 7">
+            <a:extLst>
+              <a:ext uri="{FF2B5EF4-FFF2-40B4-BE49-F238E27FC236}">
+                <a16:creationId xmlns:a16="http://schemas.microsoft.com/office/drawing/2014/main" id="{E0BD5ABB-9597-4A27-BCBD-24A44470B8E2}"/>
+              </a:ext>
+            </a:extLst>
+          </p:cNvPr>
+          <p:cNvSpPr/>
+          <p:nvPr/>
+        </p:nvSpPr>
+        <p:spPr>
+          <a:xfrm>
+            <a:off x="5919195" y="4644043"/>
+            <a:ext cx="947650" cy="582096"/>
+          </a:xfrm>
+          <a:prstGeom prst="rightArrow">
+            <a:avLst/>
+          </a:prstGeom>
+        </p:spPr>
+        <p:style>
+          <a:lnRef idx="2">
+            <a:schemeClr val="accent1">
+              <a:shade val="50000"/>
+            </a:schemeClr>
+          </a:lnRef>
+          <a:fillRef idx="1">
+            <a:schemeClr val="accent1"/>
+          </a:fillRef>
+          <a:effectRef idx="0">
+            <a:schemeClr val="accent1"/>
+          </a:effectRef>
+          <a:fontRef idx="minor">
+            <a:schemeClr val="lt1"/>
+          </a:fontRef>
+        </p:style>
+        <p:txBody>
+          <a:bodyPr rtlCol="0" anchor="ctr"/>
+          <a:lstStyle/>
+          <a:p>
+            <a:pPr algn="ctr"/>
+            <a:endParaRPr lang="en-US"/>
+          </a:p>
+        </p:txBody>
+      </p:sp>
     </p:spTree>
     <p:extLst>
       <p:ext uri="{BB962C8B-B14F-4D97-AF65-F5344CB8AC3E}">
@@ -8852,7 +8937,7 @@
           <a:p>
             <a:r>
               <a:rPr lang="en-US" dirty="0"/>
-              <a:t>Data Exploration</a:t>
+              <a:t>Data Exploration/Pre-processing</a:t>
             </a:r>
           </a:p>
         </p:txBody>
@@ -9049,6 +9134,67 @@
               <a:rPr lang="en-US" dirty="0"/>
               <a:t>Baths</a:t>
             </a:r>
+          </a:p>
+        </p:txBody>
+      </p:sp>
+      <p:sp>
+        <p:nvSpPr>
+          <p:cNvPr id="13" name="Content Placeholder 2">
+            <a:extLst>
+              <a:ext uri="{FF2B5EF4-FFF2-40B4-BE49-F238E27FC236}">
+                <a16:creationId xmlns:a16="http://schemas.microsoft.com/office/drawing/2014/main" id="{5A70B0DA-112D-4CB0-930F-3C1E85E146AF}"/>
+              </a:ext>
+            </a:extLst>
+          </p:cNvPr>
+          <p:cNvSpPr>
+            <a:spLocks noGrp="1"/>
+          </p:cNvSpPr>
+          <p:nvPr>
+            <p:ph idx="1"/>
+          </p:nvPr>
+        </p:nvSpPr>
+        <p:spPr>
+          <a:xfrm>
+            <a:off x="609982" y="4647541"/>
+            <a:ext cx="9613861" cy="1654785"/>
+          </a:xfrm>
+        </p:spPr>
+        <p:txBody>
+          <a:bodyPr>
+            <a:normAutofit/>
+          </a:bodyPr>
+          <a:lstStyle/>
+          <a:p>
+            <a:r>
+              <a:rPr lang="en-US" dirty="0"/>
+              <a:t>Valuable information about the properties</a:t>
+            </a:r>
+          </a:p>
+          <a:p>
+            <a:r>
+              <a:rPr lang="en-US" dirty="0"/>
+              <a:t>Numeric attributes</a:t>
+            </a:r>
+          </a:p>
+          <a:p>
+            <a:pPr lvl="1"/>
+            <a:endParaRPr lang="en-US" dirty="0"/>
+          </a:p>
+          <a:p>
+            <a:pPr lvl="1"/>
+            <a:endParaRPr lang="en-US" dirty="0"/>
+          </a:p>
+          <a:p>
+            <a:pPr lvl="1"/>
+            <a:endParaRPr lang="en-US" dirty="0"/>
+          </a:p>
+          <a:p>
+            <a:pPr lvl="1"/>
+            <a:endParaRPr lang="en-US" dirty="0"/>
+          </a:p>
+          <a:p>
+            <a:pPr lvl="1"/>
+            <a:endParaRPr lang="en-US" dirty="0"/>
           </a:p>
         </p:txBody>
       </p:sp>
@@ -9105,7 +9251,7 @@
           <a:p>
             <a:r>
               <a:rPr lang="en-US" dirty="0"/>
-              <a:t>Data Pre-processing</a:t>
+              <a:t>Data Exploration/Pre-processing</a:t>
             </a:r>
           </a:p>
         </p:txBody>
@@ -9128,79 +9274,28 @@
         </p:nvSpPr>
         <p:spPr>
           <a:xfrm>
-            <a:off x="680321" y="2336873"/>
-            <a:ext cx="9613861" cy="4111428"/>
+            <a:off x="624049" y="5104741"/>
+            <a:ext cx="9613861" cy="1654785"/>
           </a:xfrm>
         </p:spPr>
         <p:txBody>
           <a:bodyPr>
-            <a:normAutofit/>
+            <a:normAutofit lnSpcReduction="10000"/>
           </a:bodyPr>
           <a:lstStyle/>
           <a:p>
             <a:r>
               <a:rPr lang="en-US" dirty="0"/>
-              <a:t>Certain attributes could be filtered out immediately:</a:t>
-            </a:r>
-          </a:p>
-          <a:p>
-            <a:pPr lvl="1"/>
+              <a:t>Certain attributes could be filtered out immediately</a:t>
+            </a:r>
+          </a:p>
+          <a:p>
             <a:r>
               <a:rPr lang="en-US" dirty="0"/>
-              <a:t>“Sold Date” is blank because these are all active listings</a:t>
-            </a:r>
-          </a:p>
-          <a:p>
-            <a:pPr lvl="1"/>
-            <a:r>
-              <a:rPr lang="en-US" dirty="0"/>
-              <a:t>“State” All non-MA Listings were Dropped</a:t>
-            </a:r>
-          </a:p>
-          <a:p>
-            <a:pPr lvl="1"/>
-            <a:r>
-              <a:rPr lang="en-US" dirty="0"/>
-              <a:t>“Sale Type” is all MLS Listing (after filtering on MA listings)</a:t>
-            </a:r>
-          </a:p>
-          <a:p>
-            <a:pPr lvl="1"/>
-            <a:r>
-              <a:rPr lang="en-US" dirty="0"/>
-              <a:t>“Interested” and “Favorited” are user-specific Boolean fields</a:t>
-            </a:r>
-          </a:p>
-          <a:p>
-            <a:pPr lvl="1"/>
-            <a:r>
-              <a:rPr lang="en-US" dirty="0"/>
-              <a:t>“Address” is unique for each tuple and dropped to avoid overfitting</a:t>
-            </a:r>
-          </a:p>
-          <a:p>
-            <a:pPr lvl="1"/>
-            <a:r>
-              <a:rPr lang="en-US" dirty="0"/>
-              <a:t>“Status” is all “Active” so it was dropped</a:t>
-            </a:r>
-          </a:p>
-          <a:p>
-            <a:pPr lvl="1"/>
-            <a:r>
-              <a:rPr lang="en-US" dirty="0"/>
-              <a:t>“URL” is unique for each tuple and was dropped</a:t>
-            </a:r>
-          </a:p>
-          <a:p>
-            <a:pPr lvl="1"/>
-            <a:r>
-              <a:rPr lang="en-US" dirty="0"/>
-              <a:t>“Open House Date/times” was dropped</a:t>
-            </a:r>
-          </a:p>
-          <a:p>
-            <a:pPr lvl="1"/>
+              <a:t>Avoid overfitting</a:t>
+            </a:r>
+          </a:p>
+          <a:p>
             <a:r>
               <a:rPr lang="en-US" dirty="0"/>
               <a:t>Any fields not related to the actual physical characteristics of the land/additions were dropped</a:t>
@@ -9225,6 +9320,136 @@
           <a:p>
             <a:pPr lvl="1"/>
             <a:endParaRPr lang="en-US" dirty="0"/>
+          </a:p>
+        </p:txBody>
+      </p:sp>
+      <p:pic>
+        <p:nvPicPr>
+          <p:cNvPr id="4" name="Picture 3">
+            <a:extLst>
+              <a:ext uri="{FF2B5EF4-FFF2-40B4-BE49-F238E27FC236}">
+                <a16:creationId xmlns:a16="http://schemas.microsoft.com/office/drawing/2014/main" id="{01139F55-0E60-45F7-A664-1617C5AD21BD}"/>
+              </a:ext>
+            </a:extLst>
+          </p:cNvPr>
+          <p:cNvPicPr>
+            <a:picLocks noChangeAspect="1"/>
+          </p:cNvPicPr>
+          <p:nvPr/>
+        </p:nvPicPr>
+        <p:blipFill>
+          <a:blip r:embed="rId2"/>
+          <a:stretch>
+            <a:fillRect/>
+          </a:stretch>
+        </p:blipFill>
+        <p:spPr>
+          <a:xfrm>
+            <a:off x="673388" y="2402282"/>
+            <a:ext cx="4757592" cy="2479207"/>
+          </a:xfrm>
+          <a:prstGeom prst="rect">
+            <a:avLst/>
+          </a:prstGeom>
+        </p:spPr>
+      </p:pic>
+      <p:sp>
+        <p:nvSpPr>
+          <p:cNvPr id="5" name="TextBox 4">
+            <a:extLst>
+              <a:ext uri="{FF2B5EF4-FFF2-40B4-BE49-F238E27FC236}">
+                <a16:creationId xmlns:a16="http://schemas.microsoft.com/office/drawing/2014/main" id="{AD181B7F-023A-4F31-A62D-4D8BF87EA2CB}"/>
+              </a:ext>
+            </a:extLst>
+          </p:cNvPr>
+          <p:cNvSpPr txBox="1"/>
+          <p:nvPr/>
+        </p:nvSpPr>
+        <p:spPr>
+          <a:xfrm>
+            <a:off x="560771" y="2032950"/>
+            <a:ext cx="1600200" cy="369332"/>
+          </a:xfrm>
+          <a:prstGeom prst="rect">
+            <a:avLst/>
+          </a:prstGeom>
+          <a:noFill/>
+        </p:spPr>
+        <p:txBody>
+          <a:bodyPr wrap="square" rtlCol="0">
+            <a:spAutoFit/>
+          </a:bodyPr>
+          <a:lstStyle/>
+          <a:p>
+            <a:r>
+              <a:rPr lang="en-US" dirty="0"/>
+              <a:t>Address</a:t>
+            </a:r>
+          </a:p>
+        </p:txBody>
+      </p:sp>
+      <p:pic>
+        <p:nvPicPr>
+          <p:cNvPr id="6" name="Picture 5">
+            <a:extLst>
+              <a:ext uri="{FF2B5EF4-FFF2-40B4-BE49-F238E27FC236}">
+                <a16:creationId xmlns:a16="http://schemas.microsoft.com/office/drawing/2014/main" id="{2DC0A8F8-63C9-4FCC-9A27-840E3FA328FA}"/>
+              </a:ext>
+            </a:extLst>
+          </p:cNvPr>
+          <p:cNvPicPr>
+            <a:picLocks noChangeAspect="1"/>
+          </p:cNvPicPr>
+          <p:nvPr/>
+        </p:nvPicPr>
+        <p:blipFill>
+          <a:blip r:embed="rId3"/>
+          <a:stretch>
+            <a:fillRect/>
+          </a:stretch>
+        </p:blipFill>
+        <p:spPr>
+          <a:xfrm>
+            <a:off x="6096000" y="2402281"/>
+            <a:ext cx="4855114" cy="2479207"/>
+          </a:xfrm>
+          <a:prstGeom prst="rect">
+            <a:avLst/>
+          </a:prstGeom>
+        </p:spPr>
+      </p:pic>
+      <p:sp>
+        <p:nvSpPr>
+          <p:cNvPr id="7" name="TextBox 6">
+            <a:extLst>
+              <a:ext uri="{FF2B5EF4-FFF2-40B4-BE49-F238E27FC236}">
+                <a16:creationId xmlns:a16="http://schemas.microsoft.com/office/drawing/2014/main" id="{D844EF2B-D74E-411F-AECD-9F4F1EF2BF91}"/>
+              </a:ext>
+            </a:extLst>
+          </p:cNvPr>
+          <p:cNvSpPr txBox="1"/>
+          <p:nvPr/>
+        </p:nvSpPr>
+        <p:spPr>
+          <a:xfrm>
+            <a:off x="6002623" y="1994362"/>
+            <a:ext cx="1600200" cy="369332"/>
+          </a:xfrm>
+          <a:prstGeom prst="rect">
+            <a:avLst/>
+          </a:prstGeom>
+          <a:noFill/>
+        </p:spPr>
+        <p:txBody>
+          <a:bodyPr wrap="square" rtlCol="0">
+            <a:spAutoFit/>
+          </a:bodyPr>
+          <a:lstStyle/>
+          <a:p>
+            <a:r>
+              <a:rPr lang="en-US" dirty="0"/>
+              <a:t>Sale Type</a:t>
+            </a:r>
           </a:p>
         </p:txBody>
       </p:sp>
@@ -9281,7 +9506,7 @@
           <a:p>
             <a:r>
               <a:rPr lang="en-US" dirty="0"/>
-              <a:t>More Data Exploration</a:t>
+              <a:t>Missing Data/Outlier handling</a:t>
             </a:r>
           </a:p>
         </p:txBody>
@@ -9569,7 +9794,7 @@
           <a:p>
             <a:r>
               <a:rPr lang="en-US" dirty="0"/>
-              <a:t>More Data Pre-processing</a:t>
+              <a:t>Missing Data/Outlier handling</a:t>
             </a:r>
           </a:p>
         </p:txBody>
@@ -9592,7 +9817,7 @@
         </p:nvSpPr>
         <p:spPr>
           <a:xfrm>
-            <a:off x="77190" y="1977243"/>
+            <a:off x="81148" y="1994805"/>
             <a:ext cx="12029703" cy="2749136"/>
           </a:xfrm>
         </p:spPr>
@@ -9694,8 +9919,8 @@
         </p:blipFill>
         <p:spPr>
           <a:xfrm>
-            <a:off x="7858954" y="3961472"/>
-            <a:ext cx="3821834" cy="2455658"/>
+            <a:off x="7162501" y="3813760"/>
+            <a:ext cx="4179566" cy="2685513"/>
           </a:xfrm>
           <a:prstGeom prst="rect">
             <a:avLst/>
@@ -9716,7 +9941,7 @@
         </p:nvSpPr>
         <p:spPr>
           <a:xfrm>
-            <a:off x="9317598" y="6417130"/>
+            <a:off x="8643143" y="6488668"/>
             <a:ext cx="2428504" cy="369332"/>
           </a:xfrm>
           <a:prstGeom prst="rect">
@@ -9751,7 +9976,7 @@
         </p:nvSpPr>
         <p:spPr>
           <a:xfrm>
-            <a:off x="6889094" y="4904580"/>
+            <a:off x="6214639" y="5004635"/>
             <a:ext cx="2428504" cy="369332"/>
           </a:xfrm>
           <a:prstGeom prst="rect">
@@ -9768,55 +9993,6 @@
             <a:r>
               <a:rPr lang="en-US" dirty="0"/>
               <a:t>lot size</a:t>
-            </a:r>
-          </a:p>
-        </p:txBody>
-      </p:sp>
-      <p:sp>
-        <p:nvSpPr>
-          <p:cNvPr id="11" name="TextBox 10">
-            <a:extLst>
-              <a:ext uri="{FF2B5EF4-FFF2-40B4-BE49-F238E27FC236}">
-                <a16:creationId xmlns:a16="http://schemas.microsoft.com/office/drawing/2014/main" id="{95ED9B06-EB4F-4125-B360-5E74DE6D7B8F}"/>
-              </a:ext>
-            </a:extLst>
-          </p:cNvPr>
-          <p:cNvSpPr txBox="1"/>
-          <p:nvPr/>
-        </p:nvSpPr>
-        <p:spPr>
-          <a:xfrm>
-            <a:off x="65315" y="4662804"/>
-            <a:ext cx="6835655" cy="1754326"/>
-          </a:xfrm>
-          <a:prstGeom prst="rect">
-            <a:avLst/>
-          </a:prstGeom>
-          <a:noFill/>
-        </p:spPr>
-        <p:txBody>
-          <a:bodyPr wrap="square" rtlCol="0">
-            <a:spAutoFit/>
-          </a:bodyPr>
-          <a:lstStyle/>
-          <a:p>
-            <a:pPr marL="285750" indent="-285750">
-              <a:buFont typeface="Arial" panose="020B0604020202020204" pitchFamily="34" charset="0"/>
-              <a:buChar char="•"/>
-            </a:pPr>
-            <a:r>
-              <a:rPr lang="en-US" dirty="0"/>
-              <a:t>Equal width and equal depth binning on list price were both attempted, due to sparseness of data in the high end of the list price range, the resulting distribution of listings per bin was very skewed.</a:t>
-            </a:r>
-          </a:p>
-          <a:p>
-            <a:pPr marL="285750" indent="-285750">
-              <a:buFont typeface="Arial" panose="020B0604020202020204" pitchFamily="34" charset="0"/>
-              <a:buChar char="•"/>
-            </a:pPr>
-            <a:r>
-              <a:rPr lang="en-US" dirty="0"/>
-              <a:t>We ultimately settled on equal depth binning for discretizing our class attribute (LIST PRICE)</a:t>
             </a:r>
           </a:p>
         </p:txBody>

</xml_diff>